<commit_message>
Avance de la presentación
</commit_message>
<xml_diff>
--- a/Presentación_Final.pptx
+++ b/Presentación_Final.pptx
@@ -10,13 +10,15 @@
     <p:sldId id="261" r:id="rId4"/>
     <p:sldId id="268" r:id="rId5"/>
     <p:sldId id="263" r:id="rId6"/>
-    <p:sldId id="264" r:id="rId7"/>
-    <p:sldId id="265" r:id="rId8"/>
-    <p:sldId id="259" r:id="rId9"/>
-    <p:sldId id="262" r:id="rId10"/>
-    <p:sldId id="266" r:id="rId11"/>
-    <p:sldId id="267" r:id="rId12"/>
-    <p:sldId id="260" r:id="rId13"/>
+    <p:sldId id="269" r:id="rId7"/>
+    <p:sldId id="270" r:id="rId8"/>
+    <p:sldId id="264" r:id="rId9"/>
+    <p:sldId id="265" r:id="rId10"/>
+    <p:sldId id="259" r:id="rId11"/>
+    <p:sldId id="262" r:id="rId12"/>
+    <p:sldId id="266" r:id="rId13"/>
+    <p:sldId id="267" r:id="rId14"/>
+    <p:sldId id="260" r:id="rId15"/>
   </p:sldIdLst>
   <p:sldSz cx="12192000" cy="6858000"/>
   <p:notesSz cx="6858000" cy="9144000"/>
@@ -274,7 +276,7 @@
           <a:p>
             <a:fld id="{2F3E8B1C-86EF-43CF-8304-249481088644}" type="datetimeFigureOut">
               <a:rPr lang="en-US" smtClean="0"/>
-              <a:t>11/18/2022</a:t>
+              <a:t>11/22/2022</a:t>
             </a:fld>
             <a:endParaRPr lang="en-US"/>
           </a:p>
@@ -472,7 +474,7 @@
           <a:p>
             <a:fld id="{2F3E8B1C-86EF-43CF-8304-249481088644}" type="datetimeFigureOut">
               <a:rPr lang="en-US" smtClean="0"/>
-              <a:t>11/18/2022</a:t>
+              <a:t>11/22/2022</a:t>
             </a:fld>
             <a:endParaRPr lang="en-US"/>
           </a:p>
@@ -680,7 +682,7 @@
           <a:p>
             <a:fld id="{2F3E8B1C-86EF-43CF-8304-249481088644}" type="datetimeFigureOut">
               <a:rPr lang="en-US" smtClean="0"/>
-              <a:t>11/18/2022</a:t>
+              <a:t>11/22/2022</a:t>
             </a:fld>
             <a:endParaRPr lang="en-US"/>
           </a:p>
@@ -878,7 +880,7 @@
           <a:p>
             <a:fld id="{2F3E8B1C-86EF-43CF-8304-249481088644}" type="datetimeFigureOut">
               <a:rPr lang="en-US" smtClean="0"/>
-              <a:t>11/18/2022</a:t>
+              <a:t>11/22/2022</a:t>
             </a:fld>
             <a:endParaRPr lang="en-US"/>
           </a:p>
@@ -1153,7 +1155,7 @@
           <a:p>
             <a:fld id="{2F3E8B1C-86EF-43CF-8304-249481088644}" type="datetimeFigureOut">
               <a:rPr lang="en-US" smtClean="0"/>
-              <a:t>11/18/2022</a:t>
+              <a:t>11/22/2022</a:t>
             </a:fld>
             <a:endParaRPr lang="en-US"/>
           </a:p>
@@ -1423,7 +1425,7 @@
           <a:p>
             <a:fld id="{2F3E8B1C-86EF-43CF-8304-249481088644}" type="datetimeFigureOut">
               <a:rPr lang="en-US" smtClean="0"/>
-              <a:t>11/18/2022</a:t>
+              <a:t>11/22/2022</a:t>
             </a:fld>
             <a:endParaRPr lang="en-US"/>
           </a:p>
@@ -1843,7 +1845,7 @@
           <a:p>
             <a:fld id="{2F3E8B1C-86EF-43CF-8304-249481088644}" type="datetimeFigureOut">
               <a:rPr lang="en-US" smtClean="0"/>
-              <a:t>11/18/2022</a:t>
+              <a:t>11/22/2022</a:t>
             </a:fld>
             <a:endParaRPr lang="en-US"/>
           </a:p>
@@ -1984,7 +1986,7 @@
           <a:p>
             <a:fld id="{2F3E8B1C-86EF-43CF-8304-249481088644}" type="datetimeFigureOut">
               <a:rPr lang="en-US" smtClean="0"/>
-              <a:t>11/18/2022</a:t>
+              <a:t>11/22/2022</a:t>
             </a:fld>
             <a:endParaRPr lang="en-US"/>
           </a:p>
@@ -2097,7 +2099,7 @@
           <a:p>
             <a:fld id="{2F3E8B1C-86EF-43CF-8304-249481088644}" type="datetimeFigureOut">
               <a:rPr lang="en-US" smtClean="0"/>
-              <a:t>11/18/2022</a:t>
+              <a:t>11/22/2022</a:t>
             </a:fld>
             <a:endParaRPr lang="en-US"/>
           </a:p>
@@ -2408,7 +2410,7 @@
           <a:p>
             <a:fld id="{2F3E8B1C-86EF-43CF-8304-249481088644}" type="datetimeFigureOut">
               <a:rPr lang="en-US" smtClean="0"/>
-              <a:t>11/18/2022</a:t>
+              <a:t>11/22/2022</a:t>
             </a:fld>
             <a:endParaRPr lang="en-US"/>
           </a:p>
@@ -2696,7 +2698,7 @@
           <a:p>
             <a:fld id="{2F3E8B1C-86EF-43CF-8304-249481088644}" type="datetimeFigureOut">
               <a:rPr lang="en-US" smtClean="0"/>
-              <a:t>11/18/2022</a:t>
+              <a:t>11/22/2022</a:t>
             </a:fld>
             <a:endParaRPr lang="en-US"/>
           </a:p>
@@ -2937,7 +2939,7 @@
             <a:fld id="{2F3E8B1C-86EF-43CF-8304-249481088644}" type="datetimeFigureOut">
               <a:rPr lang="en-US" smtClean="0"/>
               <a:pPr/>
-              <a:t>11/18/2022</a:t>
+              <a:t>11/22/2022</a:t>
             </a:fld>
             <a:endParaRPr lang="en-US" dirty="0"/>
           </a:p>
@@ -3966,6 +3968,14 @@
 <file path=ppt/slides/slide10.xml><?xml version="1.0" encoding="utf-8"?>
 <p:sld xmlns:a="http://schemas.openxmlformats.org/drawingml/2006/main" xmlns:r="http://schemas.openxmlformats.org/officeDocument/2006/relationships" xmlns:p="http://schemas.openxmlformats.org/presentationml/2006/main">
   <p:cSld>
+    <p:bg>
+      <p:bgPr>
+        <a:solidFill>
+          <a:schemeClr val="bg1"/>
+        </a:solidFill>
+        <a:effectLst/>
+      </p:bgPr>
+    </p:bg>
     <p:spTree>
       <p:nvGrpSpPr>
         <p:cNvPr id="1" name=""/>
@@ -3980,80 +3990,306 @@
           <a:chExt cx="0" cy="0"/>
         </a:xfrm>
       </p:grpSpPr>
-      <p:sp>
-        <p:nvSpPr>
-          <p:cNvPr id="2" name="Título 1">
-            <a:extLst>
-              <a:ext uri="{FF2B5EF4-FFF2-40B4-BE49-F238E27FC236}">
-                <a16:creationId xmlns:a16="http://schemas.microsoft.com/office/drawing/2014/main" id="{18A09D85-EB93-3091-BEC8-0C192C23096B}"/>
-              </a:ext>
-            </a:extLst>
-          </p:cNvPr>
-          <p:cNvSpPr>
-            <a:spLocks noGrp="1"/>
-          </p:cNvSpPr>
-          <p:nvPr>
-            <p:ph type="title"/>
+      <p:sp useBgFill="1">
+        <p:nvSpPr>
+          <p:cNvPr id="3081" name="Rectangle 3080">
+            <a:extLst>
+              <a:ext uri="{FF2B5EF4-FFF2-40B4-BE49-F238E27FC236}">
+                <a16:creationId xmlns:a16="http://schemas.microsoft.com/office/drawing/2014/main" id="{341BFA31-6544-45C2-9DA0-9E1C5E0B1959}"/>
+              </a:ext>
+              <a:ext uri="{C183D7F6-B498-43B3-948B-1728B52AA6E4}">
+                <adec:decorative xmlns:adec="http://schemas.microsoft.com/office/drawing/2017/decorative" val="1"/>
+              </a:ext>
+            </a:extLst>
+          </p:cNvPr>
+          <p:cNvSpPr>
+            <a:spLocks noGrp="1" noRot="1" noChangeAspect="1" noMove="1" noResize="1" noEditPoints="1" noAdjustHandles="1" noChangeArrowheads="1" noChangeShapeType="1" noTextEdit="1"/>
+          </p:cNvSpPr>
+          <p:nvPr>
+            <p:extLst>
+              <p:ext uri="{386F3935-93C4-4BCD-93E2-E3B085C9AB24}">
+                <p16:designElem xmlns:p16="http://schemas.microsoft.com/office/powerpoint/2015/main" val="1"/>
+              </p:ext>
+            </p:extLst>
           </p:nvPr>
         </p:nvSpPr>
         <p:spPr>
           <a:xfrm>
-            <a:off x="700635" y="922096"/>
-            <a:ext cx="10691265" cy="713757"/>
+            <a:off x="0" y="0"/>
+            <a:ext cx="12192000" cy="6858000"/>
+          </a:xfrm>
+          <a:prstGeom prst="rect">
+            <a:avLst/>
+          </a:prstGeom>
+          <a:ln w="12700" cap="flat" cmpd="sng" algn="ctr">
+            <a:noFill/>
+            <a:prstDash val="solid"/>
+            <a:miter lim="800000"/>
+          </a:ln>
+          <a:effectLst/>
+          <a:extLst>
+            <a:ext uri="{91240B29-F687-4F45-9708-019B960494DF}">
+              <a14:hiddenLine xmlns:a14="http://schemas.microsoft.com/office/drawing/2010/main" w="12700" cap="flat" cmpd="sng" algn="ctr">
+                <a:solidFill>
+                  <a:schemeClr val="accent1">
+                    <a:shade val="50000"/>
+                  </a:schemeClr>
+                </a:solidFill>
+                <a:prstDash val="solid"/>
+                <a:miter lim="800000"/>
+              </a14:hiddenLine>
+            </a:ext>
+          </a:extLst>
+        </p:spPr>
+        <p:style>
+          <a:lnRef idx="2">
+            <a:schemeClr val="accent1">
+              <a:shade val="50000"/>
+            </a:schemeClr>
+          </a:lnRef>
+          <a:fillRef idx="1">
+            <a:schemeClr val="accent1"/>
+          </a:fillRef>
+          <a:effectRef idx="0">
+            <a:schemeClr val="accent1"/>
+          </a:effectRef>
+          <a:fontRef idx="minor">
+            <a:schemeClr val="lt1"/>
+          </a:fontRef>
+        </p:style>
+        <p:txBody>
+          <a:bodyPr rtlCol="0" anchor="ctr"/>
+          <a:lstStyle/>
+          <a:p>
+            <a:pPr algn="ctr"/>
+            <a:endParaRPr lang="en-US"/>
+          </a:p>
+        </p:txBody>
+      </p:sp>
+      <p:sp>
+        <p:nvSpPr>
+          <p:cNvPr id="2" name="Título 1">
+            <a:extLst>
+              <a:ext uri="{FF2B5EF4-FFF2-40B4-BE49-F238E27FC236}">
+                <a16:creationId xmlns:a16="http://schemas.microsoft.com/office/drawing/2014/main" id="{D20D4173-25B5-7DF6-8617-1C50325D58C7}"/>
+              </a:ext>
+            </a:extLst>
+          </p:cNvPr>
+          <p:cNvSpPr>
+            <a:spLocks noGrp="1"/>
+          </p:cNvSpPr>
+          <p:nvPr>
+            <p:ph type="ctrTitle"/>
+          </p:nvPr>
+        </p:nvSpPr>
+        <p:spPr>
+          <a:xfrm>
+            <a:off x="695326" y="4742029"/>
+            <a:ext cx="10765912" cy="925950"/>
           </a:xfrm>
         </p:spPr>
         <p:txBody>
-          <a:bodyPr/>
+          <a:bodyPr>
+            <a:normAutofit/>
+          </a:bodyPr>
           <a:lstStyle/>
           <a:p>
             <a:r>
               <a:rPr lang="es-MX" b="1" dirty="0"/>
-              <a:t>Modelo de Supervivencia</a:t>
-            </a:r>
-          </a:p>
-        </p:txBody>
-      </p:sp>
-      <p:sp>
-        <p:nvSpPr>
-          <p:cNvPr id="3" name="Marcador de contenido 2">
-            <a:extLst>
-              <a:ext uri="{FF2B5EF4-FFF2-40B4-BE49-F238E27FC236}">
-                <a16:creationId xmlns:a16="http://schemas.microsoft.com/office/drawing/2014/main" id="{10B308AB-EB65-808F-E1A9-C4A976D357DE}"/>
-              </a:ext>
-            </a:extLst>
-          </p:cNvPr>
-          <p:cNvSpPr>
-            <a:spLocks noGrp="1"/>
-          </p:cNvSpPr>
-          <p:nvPr>
-            <p:ph idx="1"/>
+              <a:t>Fase 2</a:t>
+            </a:r>
+          </a:p>
+        </p:txBody>
+      </p:sp>
+      <p:sp>
+        <p:nvSpPr>
+          <p:cNvPr id="3" name="Subtítulo 2">
+            <a:extLst>
+              <a:ext uri="{FF2B5EF4-FFF2-40B4-BE49-F238E27FC236}">
+                <a16:creationId xmlns:a16="http://schemas.microsoft.com/office/drawing/2014/main" id="{1F4E2AE9-C111-DE7D-6177-3DC76E8529F5}"/>
+              </a:ext>
+            </a:extLst>
+          </p:cNvPr>
+          <p:cNvSpPr>
+            <a:spLocks noGrp="1"/>
+          </p:cNvSpPr>
+          <p:nvPr>
+            <p:ph type="subTitle" idx="1"/>
           </p:nvPr>
         </p:nvSpPr>
         <p:spPr>
           <a:xfrm>
-            <a:off x="700635" y="1635853"/>
-            <a:ext cx="10691265" cy="4293361"/>
+            <a:off x="695325" y="5731877"/>
+            <a:ext cx="8829674" cy="429622"/>
           </a:xfrm>
         </p:spPr>
         <p:txBody>
-          <a:bodyPr/>
-          <a:lstStyle/>
-          <a:p>
-            <a:pPr marL="285750" indent="-285750" algn="just"/>
-            <a:r>
-              <a:rPr lang="es-MX" b="0" i="0" dirty="0">
-                <a:effectLst/>
+          <a:bodyPr anchor="t">
+            <a:normAutofit/>
+          </a:bodyPr>
+          <a:lstStyle/>
+          <a:p>
+            <a:pPr>
+              <a:lnSpc>
+                <a:spcPct val="110000"/>
+              </a:lnSpc>
+            </a:pPr>
+            <a:r>
+              <a:rPr lang="es-MX">
                 <a:latin typeface="Consolas" panose="020B0609020204030204" pitchFamily="49" charset="0"/>
               </a:rPr>
-              <a:t>Interpretación del modelo</a:t>
-            </a:r>
-          </a:p>
-        </p:txBody>
-      </p:sp>
+              <a:t>Análisis de Supervivencia</a:t>
+            </a:r>
+          </a:p>
+        </p:txBody>
+      </p:sp>
+      <p:pic>
+        <p:nvPicPr>
+          <p:cNvPr id="3076" name="Picture 4" descr="Shopping cart design: patterns for conversion - Justinmind">
+            <a:extLst>
+              <a:ext uri="{FF2B5EF4-FFF2-40B4-BE49-F238E27FC236}">
+                <a16:creationId xmlns:a16="http://schemas.microsoft.com/office/drawing/2014/main" id="{C35C2109-D751-23CF-9702-2CF238239873}"/>
+              </a:ext>
+            </a:extLst>
+          </p:cNvPr>
+          <p:cNvPicPr>
+            <a:picLocks noChangeAspect="1" noChangeArrowheads="1"/>
+          </p:cNvPicPr>
+          <p:nvPr/>
+        </p:nvPicPr>
+        <p:blipFill>
+          <a:blip r:embed="rId2">
+            <a:extLst>
+              <a:ext uri="{28A0092B-C50C-407E-A947-70E740481C1C}">
+                <a14:useLocalDpi xmlns:a14="http://schemas.microsoft.com/office/drawing/2010/main" val="0"/>
+              </a:ext>
+            </a:extLst>
+          </a:blip>
+          <a:stretch>
+            <a:fillRect/>
+          </a:stretch>
+        </p:blipFill>
+        <p:spPr bwMode="auto">
+          <a:xfrm>
+            <a:off x="800100" y="1021983"/>
+            <a:ext cx="5134573" cy="3286126"/>
+          </a:xfrm>
+          <a:prstGeom prst="rect">
+            <a:avLst/>
+          </a:prstGeom>
+          <a:noFill/>
+          <a:extLst>
+            <a:ext uri="{909E8E84-426E-40DD-AFC4-6F175D3DCCD1}">
+              <a14:hiddenFill xmlns:a14="http://schemas.microsoft.com/office/drawing/2010/main">
+                <a:solidFill>
+                  <a:srgbClr val="FFFFFF"/>
+                </a:solidFill>
+              </a14:hiddenFill>
+            </a:ext>
+          </a:extLst>
+        </p:spPr>
+      </p:pic>
+      <p:pic>
+        <p:nvPicPr>
+          <p:cNvPr id="3074" name="Picture 2" descr="Empty Cart Projects | Photos, videos, logos, illustrations and branding on  Behance">
+            <a:extLst>
+              <a:ext uri="{FF2B5EF4-FFF2-40B4-BE49-F238E27FC236}">
+                <a16:creationId xmlns:a16="http://schemas.microsoft.com/office/drawing/2014/main" id="{882DF97A-0075-6E20-2C64-C9DE237FCAD6}"/>
+              </a:ext>
+            </a:extLst>
+          </p:cNvPr>
+          <p:cNvPicPr>
+            <a:picLocks noChangeAspect="1" noChangeArrowheads="1"/>
+          </p:cNvPicPr>
+          <p:nvPr/>
+        </p:nvPicPr>
+        <p:blipFill rotWithShape="1">
+          <a:blip r:embed="rId3">
+            <a:extLst>
+              <a:ext uri="{28A0092B-C50C-407E-A947-70E740481C1C}">
+                <a14:useLocalDpi xmlns:a14="http://schemas.microsoft.com/office/drawing/2010/main" val="0"/>
+              </a:ext>
+            </a:extLst>
+          </a:blip>
+          <a:srcRect b="8317"/>
+          <a:stretch/>
+        </p:blipFill>
+        <p:spPr bwMode="auto">
+          <a:xfrm>
+            <a:off x="6809555" y="1021983"/>
+            <a:ext cx="4582345" cy="3286123"/>
+          </a:xfrm>
+          <a:prstGeom prst="rect">
+            <a:avLst/>
+          </a:prstGeom>
+          <a:noFill/>
+          <a:extLst>
+            <a:ext uri="{909E8E84-426E-40DD-AFC4-6F175D3DCCD1}">
+              <a14:hiddenFill xmlns:a14="http://schemas.microsoft.com/office/drawing/2010/main">
+                <a:solidFill>
+                  <a:srgbClr val="FFFFFF"/>
+                </a:solidFill>
+              </a14:hiddenFill>
+            </a:ext>
+          </a:extLst>
+        </p:spPr>
+      </p:pic>
+      <p:cxnSp>
+        <p:nvCxnSpPr>
+          <p:cNvPr id="3083" name="Straight Connector 3082">
+            <a:extLst>
+              <a:ext uri="{FF2B5EF4-FFF2-40B4-BE49-F238E27FC236}">
+                <a16:creationId xmlns:a16="http://schemas.microsoft.com/office/drawing/2014/main" id="{DC36F877-5419-44C1-A2CD-376BDDDC3E41}"/>
+              </a:ext>
+              <a:ext uri="{C183D7F6-B498-43B3-948B-1728B52AA6E4}">
+                <adec:decorative xmlns:adec="http://schemas.microsoft.com/office/drawing/2017/decorative" val="1"/>
+              </a:ext>
+            </a:extLst>
+          </p:cNvPr>
+          <p:cNvCxnSpPr>
+            <a:cxnSpLocks noGrp="1" noRot="1" noChangeAspect="1" noMove="1" noResize="1" noEditPoints="1" noAdjustHandles="1" noChangeArrowheads="1" noChangeShapeType="1"/>
+          </p:cNvCxnSpPr>
+          <p:nvPr>
+            <p:extLst>
+              <p:ext uri="{386F3935-93C4-4BCD-93E2-E3B085C9AB24}">
+                <p16:designElem xmlns:p16="http://schemas.microsoft.com/office/powerpoint/2015/main" val="1"/>
+              </p:ext>
+            </p:extLst>
+          </p:nvPr>
+        </p:nvCxnSpPr>
+        <p:spPr>
+          <a:xfrm>
+            <a:off x="800100" y="4667603"/>
+            <a:ext cx="10591800" cy="0"/>
+          </a:xfrm>
+          <a:prstGeom prst="line">
+            <a:avLst/>
+          </a:prstGeom>
+          <a:ln w="44450">
+            <a:solidFill>
+              <a:schemeClr val="tx1"/>
+            </a:solidFill>
+          </a:ln>
+        </p:spPr>
+        <p:style>
+          <a:lnRef idx="1">
+            <a:schemeClr val="accent1"/>
+          </a:lnRef>
+          <a:fillRef idx="0">
+            <a:schemeClr val="accent1"/>
+          </a:fillRef>
+          <a:effectRef idx="0">
+            <a:schemeClr val="accent1"/>
+          </a:effectRef>
+          <a:fontRef idx="minor">
+            <a:schemeClr val="tx1"/>
+          </a:fontRef>
+        </p:style>
+      </p:cxnSp>
     </p:spTree>
     <p:extLst>
       <p:ext uri="{BB962C8B-B14F-4D97-AF65-F5344CB8AC3E}">
-        <p14:creationId xmlns:p14="http://schemas.microsoft.com/office/powerpoint/2010/main" val="2623435287"/>
+        <p14:creationId xmlns:p14="http://schemas.microsoft.com/office/powerpoint/2010/main" val="1526287764"/>
       </p:ext>
     </p:extLst>
   </p:cSld>
@@ -4108,6 +4344,203 @@
           <a:p>
             <a:r>
               <a:rPr lang="es-MX" b="1" dirty="0"/>
+              <a:t>Definición del Problema</a:t>
+            </a:r>
+          </a:p>
+        </p:txBody>
+      </p:sp>
+      <p:sp>
+        <p:nvSpPr>
+          <p:cNvPr id="3" name="Marcador de contenido 2">
+            <a:extLst>
+              <a:ext uri="{FF2B5EF4-FFF2-40B4-BE49-F238E27FC236}">
+                <a16:creationId xmlns:a16="http://schemas.microsoft.com/office/drawing/2014/main" id="{10B308AB-EB65-808F-E1A9-C4A976D357DE}"/>
+              </a:ext>
+            </a:extLst>
+          </p:cNvPr>
+          <p:cNvSpPr>
+            <a:spLocks noGrp="1"/>
+          </p:cNvSpPr>
+          <p:nvPr>
+            <p:ph idx="1"/>
+          </p:nvPr>
+        </p:nvSpPr>
+        <p:spPr>
+          <a:xfrm>
+            <a:off x="700635" y="1635853"/>
+            <a:ext cx="10691265" cy="4293361"/>
+          </a:xfrm>
+        </p:spPr>
+        <p:txBody>
+          <a:bodyPr/>
+          <a:lstStyle/>
+          <a:p>
+            <a:pPr marL="285750" indent="-285750" algn="just"/>
+            <a:endParaRPr lang="es-MX" b="0" i="0" dirty="0">
+              <a:effectLst/>
+              <a:latin typeface="Consolas" panose="020B0609020204030204" pitchFamily="49" charset="0"/>
+            </a:endParaRPr>
+          </a:p>
+        </p:txBody>
+      </p:sp>
+    </p:spTree>
+    <p:extLst>
+      <p:ext uri="{BB962C8B-B14F-4D97-AF65-F5344CB8AC3E}">
+        <p14:creationId xmlns:p14="http://schemas.microsoft.com/office/powerpoint/2010/main" val="1596593790"/>
+      </p:ext>
+    </p:extLst>
+  </p:cSld>
+  <p:clrMapOvr>
+    <a:masterClrMapping/>
+  </p:clrMapOvr>
+</p:sld>
+</file>
+
+<file path=ppt/slides/slide12.xml><?xml version="1.0" encoding="utf-8"?>
+<p:sld xmlns:a="http://schemas.openxmlformats.org/drawingml/2006/main" xmlns:r="http://schemas.openxmlformats.org/officeDocument/2006/relationships" xmlns:p="http://schemas.openxmlformats.org/presentationml/2006/main">
+  <p:cSld>
+    <p:spTree>
+      <p:nvGrpSpPr>
+        <p:cNvPr id="1" name=""/>
+        <p:cNvGrpSpPr/>
+        <p:nvPr/>
+      </p:nvGrpSpPr>
+      <p:grpSpPr>
+        <a:xfrm>
+          <a:off x="0" y="0"/>
+          <a:ext cx="0" cy="0"/>
+          <a:chOff x="0" y="0"/>
+          <a:chExt cx="0" cy="0"/>
+        </a:xfrm>
+      </p:grpSpPr>
+      <p:sp>
+        <p:nvSpPr>
+          <p:cNvPr id="2" name="Título 1">
+            <a:extLst>
+              <a:ext uri="{FF2B5EF4-FFF2-40B4-BE49-F238E27FC236}">
+                <a16:creationId xmlns:a16="http://schemas.microsoft.com/office/drawing/2014/main" id="{18A09D85-EB93-3091-BEC8-0C192C23096B}"/>
+              </a:ext>
+            </a:extLst>
+          </p:cNvPr>
+          <p:cNvSpPr>
+            <a:spLocks noGrp="1"/>
+          </p:cNvSpPr>
+          <p:nvPr>
+            <p:ph type="title"/>
+          </p:nvPr>
+        </p:nvSpPr>
+        <p:spPr>
+          <a:xfrm>
+            <a:off x="700635" y="922096"/>
+            <a:ext cx="10691265" cy="713757"/>
+          </a:xfrm>
+        </p:spPr>
+        <p:txBody>
+          <a:bodyPr/>
+          <a:lstStyle/>
+          <a:p>
+            <a:r>
+              <a:rPr lang="es-MX" b="1" dirty="0"/>
+              <a:t>Modelo de Supervivencia</a:t>
+            </a:r>
+          </a:p>
+        </p:txBody>
+      </p:sp>
+      <p:sp>
+        <p:nvSpPr>
+          <p:cNvPr id="3" name="Marcador de contenido 2">
+            <a:extLst>
+              <a:ext uri="{FF2B5EF4-FFF2-40B4-BE49-F238E27FC236}">
+                <a16:creationId xmlns:a16="http://schemas.microsoft.com/office/drawing/2014/main" id="{10B308AB-EB65-808F-E1A9-C4A976D357DE}"/>
+              </a:ext>
+            </a:extLst>
+          </p:cNvPr>
+          <p:cNvSpPr>
+            <a:spLocks noGrp="1"/>
+          </p:cNvSpPr>
+          <p:nvPr>
+            <p:ph idx="1"/>
+          </p:nvPr>
+        </p:nvSpPr>
+        <p:spPr>
+          <a:xfrm>
+            <a:off x="700635" y="1635853"/>
+            <a:ext cx="10691265" cy="4293361"/>
+          </a:xfrm>
+        </p:spPr>
+        <p:txBody>
+          <a:bodyPr/>
+          <a:lstStyle/>
+          <a:p>
+            <a:pPr marL="285750" indent="-285750" algn="just"/>
+            <a:r>
+              <a:rPr lang="es-MX" b="0" i="0" dirty="0">
+                <a:effectLst/>
+                <a:latin typeface="Consolas" panose="020B0609020204030204" pitchFamily="49" charset="0"/>
+              </a:rPr>
+              <a:t>Interpretación del modelo</a:t>
+            </a:r>
+          </a:p>
+        </p:txBody>
+      </p:sp>
+    </p:spTree>
+    <p:extLst>
+      <p:ext uri="{BB962C8B-B14F-4D97-AF65-F5344CB8AC3E}">
+        <p14:creationId xmlns:p14="http://schemas.microsoft.com/office/powerpoint/2010/main" val="2623435287"/>
+      </p:ext>
+    </p:extLst>
+  </p:cSld>
+  <p:clrMapOvr>
+    <a:masterClrMapping/>
+  </p:clrMapOvr>
+</p:sld>
+</file>
+
+<file path=ppt/slides/slide13.xml><?xml version="1.0" encoding="utf-8"?>
+<p:sld xmlns:a="http://schemas.openxmlformats.org/drawingml/2006/main" xmlns:r="http://schemas.openxmlformats.org/officeDocument/2006/relationships" xmlns:p="http://schemas.openxmlformats.org/presentationml/2006/main">
+  <p:cSld>
+    <p:spTree>
+      <p:nvGrpSpPr>
+        <p:cNvPr id="1" name=""/>
+        <p:cNvGrpSpPr/>
+        <p:nvPr/>
+      </p:nvGrpSpPr>
+      <p:grpSpPr>
+        <a:xfrm>
+          <a:off x="0" y="0"/>
+          <a:ext cx="0" cy="0"/>
+          <a:chOff x="0" y="0"/>
+          <a:chExt cx="0" cy="0"/>
+        </a:xfrm>
+      </p:grpSpPr>
+      <p:sp>
+        <p:nvSpPr>
+          <p:cNvPr id="2" name="Título 1">
+            <a:extLst>
+              <a:ext uri="{FF2B5EF4-FFF2-40B4-BE49-F238E27FC236}">
+                <a16:creationId xmlns:a16="http://schemas.microsoft.com/office/drawing/2014/main" id="{18A09D85-EB93-3091-BEC8-0C192C23096B}"/>
+              </a:ext>
+            </a:extLst>
+          </p:cNvPr>
+          <p:cNvSpPr>
+            <a:spLocks noGrp="1"/>
+          </p:cNvSpPr>
+          <p:nvPr>
+            <p:ph type="title"/>
+          </p:nvPr>
+        </p:nvSpPr>
+        <p:spPr>
+          <a:xfrm>
+            <a:off x="700635" y="922096"/>
+            <a:ext cx="10691265" cy="713757"/>
+          </a:xfrm>
+        </p:spPr>
+        <p:txBody>
+          <a:bodyPr/>
+          <a:lstStyle/>
+          <a:p>
+            <a:r>
+              <a:rPr lang="es-MX" b="1" dirty="0"/>
               <a:t>Curvas de Supervivencia</a:t>
             </a:r>
           </a:p>
@@ -4163,7 +4596,7 @@
 </p:sld>
 </file>
 
-<file path=ppt/slides/slide12.xml><?xml version="1.0" encoding="utf-8"?>
+<file path=ppt/slides/slide14.xml><?xml version="1.0" encoding="utf-8"?>
 <p:sld xmlns:a="http://schemas.openxmlformats.org/drawingml/2006/main" xmlns:r="http://schemas.openxmlformats.org/officeDocument/2006/relationships" xmlns:p="http://schemas.openxmlformats.org/presentationml/2006/main">
   <p:cSld>
     <p:spTree>
@@ -5565,25 +5998,137 @@
                 <a:effectLst/>
                 <a:latin typeface="Consolas" panose="020B0609020204030204" pitchFamily="49" charset="0"/>
               </a:rPr>
-              <a:t>Gráficas más relevantes </a:t>
-            </a:r>
-            <a:r>
-              <a:rPr lang="es-MX" b="0" i="0">
-                <a:effectLst/>
-                <a:latin typeface="Consolas" panose="020B0609020204030204" pitchFamily="49" charset="0"/>
-              </a:rPr>
-              <a:t>que explican </a:t>
-            </a:r>
-            <a:r>
-              <a:rPr lang="es-MX" b="0" i="0" dirty="0">
-                <a:effectLst/>
-                <a:latin typeface="Consolas" panose="020B0609020204030204" pitchFamily="49" charset="0"/>
-              </a:rPr>
-              <a:t>el comportamiento de los clientes</a:t>
-            </a:r>
-          </a:p>
-        </p:txBody>
-      </p:sp>
+              <a:t>Variables categóricas.</a:t>
+            </a:r>
+          </a:p>
+        </p:txBody>
+      </p:sp>
+      <p:graphicFrame>
+        <p:nvGraphicFramePr>
+          <p:cNvPr id="4" name="Objeto 3">
+            <a:extLst>
+              <a:ext uri="{FF2B5EF4-FFF2-40B4-BE49-F238E27FC236}">
+                <a16:creationId xmlns:a16="http://schemas.microsoft.com/office/drawing/2014/main" id="{6940A1EB-B05C-4F96-D329-5B19F7D66AA6}"/>
+              </a:ext>
+            </a:extLst>
+          </p:cNvPr>
+          <p:cNvGraphicFramePr>
+            <a:graphicFrameLocks noChangeAspect="1"/>
+          </p:cNvGraphicFramePr>
+          <p:nvPr>
+            <p:extLst>
+              <p:ext uri="{D42A27DB-BD31-4B8C-83A1-F6EECF244321}">
+                <p14:modId xmlns:p14="http://schemas.microsoft.com/office/powerpoint/2010/main" val="2212929824"/>
+              </p:ext>
+            </p:extLst>
+          </p:nvPr>
+        </p:nvGraphicFramePr>
+        <p:xfrm>
+          <a:off x="344521" y="2519265"/>
+          <a:ext cx="5590762" cy="3416638"/>
+        </p:xfrm>
+        <a:graphic>
+          <a:graphicData uri="http://schemas.openxmlformats.org/presentationml/2006/ole">
+            <mc:AlternateContent xmlns:mc="http://schemas.openxmlformats.org/markup-compatibility/2006">
+              <mc:Choice xmlns:v="urn:schemas-microsoft-com:vml" Requires="v">
+                <p:oleObj name="PBrush" r:id="rId2" imgW="7993440" imgH="4884480" progId="">
+                  <p:embed/>
+                </p:oleObj>
+              </mc:Choice>
+              <mc:Fallback>
+                <p:oleObj name="PBrush" r:id="rId2" imgW="7993440" imgH="4884480" progId="">
+                  <p:embed/>
+                  <p:pic>
+                    <p:nvPicPr>
+                      <p:cNvPr id="0" name=""/>
+                      <p:cNvPicPr/>
+                      <p:nvPr/>
+                    </p:nvPicPr>
+                    <p:blipFill>
+                      <a:blip r:embed="rId3"/>
+                      <a:stretch>
+                        <a:fillRect/>
+                      </a:stretch>
+                    </p:blipFill>
+                    <p:spPr>
+                      <a:xfrm>
+                        <a:off x="344521" y="2519265"/>
+                        <a:ext cx="5590762" cy="3416638"/>
+                      </a:xfrm>
+                      <a:prstGeom prst="rect">
+                        <a:avLst/>
+                      </a:prstGeom>
+                    </p:spPr>
+                  </p:pic>
+                </p:oleObj>
+              </mc:Fallback>
+            </mc:AlternateContent>
+          </a:graphicData>
+        </a:graphic>
+      </p:graphicFrame>
+      <p:graphicFrame>
+        <p:nvGraphicFramePr>
+          <p:cNvPr id="5" name="Objeto 4">
+            <a:extLst>
+              <a:ext uri="{FF2B5EF4-FFF2-40B4-BE49-F238E27FC236}">
+                <a16:creationId xmlns:a16="http://schemas.microsoft.com/office/drawing/2014/main" id="{39356F5A-986E-7ADA-7386-74FE95CA5A62}"/>
+              </a:ext>
+            </a:extLst>
+          </p:cNvPr>
+          <p:cNvGraphicFramePr>
+            <a:graphicFrameLocks noChangeAspect="1"/>
+          </p:cNvGraphicFramePr>
+          <p:nvPr>
+            <p:extLst>
+              <p:ext uri="{D42A27DB-BD31-4B8C-83A1-F6EECF244321}">
+                <p14:modId xmlns:p14="http://schemas.microsoft.com/office/powerpoint/2010/main" val="45020964"/>
+              </p:ext>
+            </p:extLst>
+          </p:nvPr>
+        </p:nvGraphicFramePr>
+        <p:xfrm>
+          <a:off x="6363499" y="2593911"/>
+          <a:ext cx="5384515" cy="3335304"/>
+        </p:xfrm>
+        <a:graphic>
+          <a:graphicData uri="http://schemas.openxmlformats.org/presentationml/2006/ole">
+            <mc:AlternateContent xmlns:mc="http://schemas.openxmlformats.org/markup-compatibility/2006">
+              <mc:Choice xmlns:v="urn:schemas-microsoft-com:vml" Requires="v">
+                <p:oleObj name="PBrush" r:id="rId4" imgW="8008560" imgH="4960800" progId="">
+                  <p:embed/>
+                </p:oleObj>
+              </mc:Choice>
+              <mc:Fallback>
+                <p:oleObj name="PBrush" r:id="rId4" imgW="8008560" imgH="4960800" progId="">
+                  <p:embed/>
+                  <p:pic>
+                    <p:nvPicPr>
+                      <p:cNvPr id="0" name=""/>
+                      <p:cNvPicPr/>
+                      <p:nvPr/>
+                    </p:nvPicPr>
+                    <p:blipFill>
+                      <a:blip r:embed="rId5"/>
+                      <a:stretch>
+                        <a:fillRect/>
+                      </a:stretch>
+                    </p:blipFill>
+                    <p:spPr>
+                      <a:xfrm>
+                        <a:off x="6363499" y="2593911"/>
+                        <a:ext cx="5384515" cy="3335304"/>
+                      </a:xfrm>
+                      <a:prstGeom prst="rect">
+                        <a:avLst/>
+                      </a:prstGeom>
+                    </p:spPr>
+                  </p:pic>
+                </p:oleObj>
+              </mc:Fallback>
+            </mc:AlternateContent>
+          </a:graphicData>
+        </a:graphic>
+      </p:graphicFrame>
     </p:spTree>
     <p:extLst>
       <p:ext uri="{BB962C8B-B14F-4D97-AF65-F5344CB8AC3E}">
@@ -5614,88 +6159,257 @@
           <a:chExt cx="0" cy="0"/>
         </a:xfrm>
       </p:grpSpPr>
-      <p:sp>
-        <p:nvSpPr>
-          <p:cNvPr id="2" name="Título 1">
-            <a:extLst>
-              <a:ext uri="{FF2B5EF4-FFF2-40B4-BE49-F238E27FC236}">
-                <a16:creationId xmlns:a16="http://schemas.microsoft.com/office/drawing/2014/main" id="{18A09D85-EB93-3091-BEC8-0C192C23096B}"/>
-              </a:ext>
-            </a:extLst>
-          </p:cNvPr>
-          <p:cNvSpPr>
-            <a:spLocks noGrp="1"/>
-          </p:cNvSpPr>
-          <p:nvPr>
-            <p:ph type="title"/>
-          </p:nvPr>
+      <p:graphicFrame>
+        <p:nvGraphicFramePr>
+          <p:cNvPr id="4" name="Objeto 3">
+            <a:extLst>
+              <a:ext uri="{FF2B5EF4-FFF2-40B4-BE49-F238E27FC236}">
+                <a16:creationId xmlns:a16="http://schemas.microsoft.com/office/drawing/2014/main" id="{B8319267-E0B7-7C51-6664-1009D13111D0}"/>
+              </a:ext>
+            </a:extLst>
+          </p:cNvPr>
+          <p:cNvGraphicFramePr>
+            <a:graphicFrameLocks noChangeAspect="1"/>
+          </p:cNvGraphicFramePr>
+          <p:nvPr>
+            <p:extLst>
+              <p:ext uri="{D42A27DB-BD31-4B8C-83A1-F6EECF244321}">
+                <p14:modId xmlns:p14="http://schemas.microsoft.com/office/powerpoint/2010/main" val="1662821805"/>
+              </p:ext>
+            </p:extLst>
+          </p:nvPr>
+        </p:nvGraphicFramePr>
+        <p:xfrm>
+          <a:off x="597219" y="825026"/>
+          <a:ext cx="4721229" cy="2921539"/>
+        </p:xfrm>
+        <a:graphic>
+          <a:graphicData uri="http://schemas.openxmlformats.org/presentationml/2006/ole">
+            <mc:AlternateContent xmlns:mc="http://schemas.openxmlformats.org/markup-compatibility/2006">
+              <mc:Choice xmlns:v="urn:schemas-microsoft-com:vml" Requires="v">
+                <p:oleObj name="PBrush" r:id="rId2" imgW="7917120" imgH="4899600" progId="">
+                  <p:embed/>
+                </p:oleObj>
+              </mc:Choice>
+              <mc:Fallback>
+                <p:oleObj name="PBrush" r:id="rId2" imgW="7917120" imgH="4899600" progId="">
+                  <p:embed/>
+                  <p:pic>
+                    <p:nvPicPr>
+                      <p:cNvPr id="0" name=""/>
+                      <p:cNvPicPr/>
+                      <p:nvPr/>
+                    </p:nvPicPr>
+                    <p:blipFill>
+                      <a:blip r:embed="rId3"/>
+                      <a:stretch>
+                        <a:fillRect/>
+                      </a:stretch>
+                    </p:blipFill>
+                    <p:spPr>
+                      <a:xfrm>
+                        <a:off x="597219" y="825026"/>
+                        <a:ext cx="4721229" cy="2921539"/>
+                      </a:xfrm>
+                      <a:prstGeom prst="rect">
+                        <a:avLst/>
+                      </a:prstGeom>
+                    </p:spPr>
+                  </p:pic>
+                </p:oleObj>
+              </mc:Fallback>
+            </mc:AlternateContent>
+          </a:graphicData>
+        </a:graphic>
+      </p:graphicFrame>
+      <p:graphicFrame>
+        <p:nvGraphicFramePr>
+          <p:cNvPr id="6" name="Objeto 5">
+            <a:extLst>
+              <a:ext uri="{FF2B5EF4-FFF2-40B4-BE49-F238E27FC236}">
+                <a16:creationId xmlns:a16="http://schemas.microsoft.com/office/drawing/2014/main" id="{E44C9F2F-7B46-1A5C-A82B-6C0DF1B64B8B}"/>
+              </a:ext>
+            </a:extLst>
+          </p:cNvPr>
+          <p:cNvGraphicFramePr>
+            <a:graphicFrameLocks noChangeAspect="1"/>
+          </p:cNvGraphicFramePr>
+          <p:nvPr>
+            <p:extLst>
+              <p:ext uri="{D42A27DB-BD31-4B8C-83A1-F6EECF244321}">
+                <p14:modId xmlns:p14="http://schemas.microsoft.com/office/powerpoint/2010/main" val="3693704551"/>
+              </p:ext>
+            </p:extLst>
+          </p:nvPr>
+        </p:nvGraphicFramePr>
+        <p:xfrm>
+          <a:off x="6634065" y="825026"/>
+          <a:ext cx="4848748" cy="3155713"/>
+        </p:xfrm>
+        <a:graphic>
+          <a:graphicData uri="http://schemas.openxmlformats.org/presentationml/2006/ole">
+            <mc:AlternateContent xmlns:mc="http://schemas.openxmlformats.org/markup-compatibility/2006">
+              <mc:Choice xmlns:v="urn:schemas-microsoft-com:vml" Requires="v">
+                <p:oleObj name="PBrush" r:id="rId4" imgW="7551360" imgH="4915080" progId="">
+                  <p:embed/>
+                </p:oleObj>
+              </mc:Choice>
+              <mc:Fallback>
+                <p:oleObj name="PBrush" r:id="rId4" imgW="7551360" imgH="4915080" progId="">
+                  <p:embed/>
+                  <p:pic>
+                    <p:nvPicPr>
+                      <p:cNvPr id="0" name=""/>
+                      <p:cNvPicPr/>
+                      <p:nvPr/>
+                    </p:nvPicPr>
+                    <p:blipFill>
+                      <a:blip r:embed="rId5"/>
+                      <a:stretch>
+                        <a:fillRect/>
+                      </a:stretch>
+                    </p:blipFill>
+                    <p:spPr>
+                      <a:xfrm>
+                        <a:off x="6634065" y="825026"/>
+                        <a:ext cx="4848748" cy="3155713"/>
+                      </a:xfrm>
+                      <a:prstGeom prst="rect">
+                        <a:avLst/>
+                      </a:prstGeom>
+                    </p:spPr>
+                  </p:pic>
+                </p:oleObj>
+              </mc:Fallback>
+            </mc:AlternateContent>
+          </a:graphicData>
+        </a:graphic>
+      </p:graphicFrame>
+      <p:sp>
+        <p:nvSpPr>
+          <p:cNvPr id="7" name="CuadroTexto 6">
+            <a:extLst>
+              <a:ext uri="{FF2B5EF4-FFF2-40B4-BE49-F238E27FC236}">
+                <a16:creationId xmlns:a16="http://schemas.microsoft.com/office/drawing/2014/main" id="{0E5CAA6F-E165-5199-C8AC-4207BA6FFEC9}"/>
+              </a:ext>
+            </a:extLst>
+          </p:cNvPr>
+          <p:cNvSpPr txBox="1"/>
+          <p:nvPr/>
         </p:nvSpPr>
         <p:spPr>
           <a:xfrm>
-            <a:off x="700635" y="922096"/>
-            <a:ext cx="10691265" cy="713757"/>
+            <a:off x="970384" y="4422710"/>
+            <a:ext cx="4180114" cy="861774"/>
           </a:xfrm>
+          <a:prstGeom prst="rect">
+            <a:avLst/>
+          </a:prstGeom>
+          <a:noFill/>
         </p:spPr>
         <p:txBody>
-          <a:bodyPr/>
-          <a:lstStyle/>
-          <a:p>
-            <a:r>
-              <a:rPr lang="es-MX" b="1" dirty="0"/>
-              <a:t>Modelo</a:t>
-            </a:r>
-          </a:p>
-        </p:txBody>
-      </p:sp>
-      <p:sp>
-        <p:nvSpPr>
-          <p:cNvPr id="3" name="Marcador de contenido 2">
-            <a:extLst>
-              <a:ext uri="{FF2B5EF4-FFF2-40B4-BE49-F238E27FC236}">
-                <a16:creationId xmlns:a16="http://schemas.microsoft.com/office/drawing/2014/main" id="{10B308AB-EB65-808F-E1A9-C4A976D357DE}"/>
-              </a:ext>
-            </a:extLst>
-          </p:cNvPr>
-          <p:cNvSpPr>
-            <a:spLocks noGrp="1"/>
-          </p:cNvSpPr>
-          <p:nvPr>
-            <p:ph idx="1"/>
-          </p:nvPr>
+          <a:bodyPr wrap="square" rtlCol="0">
+            <a:spAutoFit/>
+          </a:bodyPr>
+          <a:lstStyle/>
+          <a:p>
+            <a:r>
+              <a:rPr lang="es-MX" sz="1600" dirty="0"/>
+              <a:t>Mean:</a:t>
+            </a:r>
+          </a:p>
+          <a:p>
+            <a:r>
+              <a:rPr lang="es-MX" sz="1600" dirty="0"/>
+              <a:t>Median:</a:t>
+            </a:r>
+          </a:p>
+          <a:p>
+            <a:r>
+              <a:rPr lang="es-MX" sz="1600" dirty="0"/>
+              <a:t>Q3:</a:t>
+            </a:r>
+          </a:p>
+        </p:txBody>
+      </p:sp>
+      <p:sp>
+        <p:nvSpPr>
+          <p:cNvPr id="8" name="CuadroTexto 7">
+            <a:extLst>
+              <a:ext uri="{FF2B5EF4-FFF2-40B4-BE49-F238E27FC236}">
+                <a16:creationId xmlns:a16="http://schemas.microsoft.com/office/drawing/2014/main" id="{22BAB8B9-04A5-68C1-16ED-B65DD244F797}"/>
+              </a:ext>
+            </a:extLst>
+          </p:cNvPr>
+          <p:cNvSpPr txBox="1"/>
+          <p:nvPr/>
         </p:nvSpPr>
         <p:spPr>
           <a:xfrm>
-            <a:off x="700635" y="1635853"/>
-            <a:ext cx="10691265" cy="4293361"/>
+            <a:off x="6634065" y="4422710"/>
+            <a:ext cx="4180114" cy="861774"/>
           </a:xfrm>
+          <a:prstGeom prst="rect">
+            <a:avLst/>
+          </a:prstGeom>
+          <a:noFill/>
         </p:spPr>
         <p:txBody>
-          <a:bodyPr/>
-          <a:lstStyle/>
-          <a:p>
-            <a:pPr marL="285750" indent="-285750"/>
-            <a:r>
-              <a:rPr lang="es-MX" b="0" i="0" dirty="0">
-                <a:effectLst/>
-                <a:latin typeface="Consolas" panose="020B0609020204030204" pitchFamily="49" charset="0"/>
-              </a:rPr>
-              <a:t>Variables utilizadas</a:t>
-            </a:r>
-          </a:p>
-          <a:p>
-            <a:pPr marL="285750" indent="-285750"/>
-            <a:r>
-              <a:rPr lang="es-MX" dirty="0">
-                <a:latin typeface="Consolas" panose="020B0609020204030204" pitchFamily="49" charset="0"/>
-              </a:rPr>
-              <a:t>I</a:t>
-            </a:r>
-            <a:r>
-              <a:rPr lang="es-MX" b="0" i="0" dirty="0">
-                <a:effectLst/>
-                <a:latin typeface="Consolas" panose="020B0609020204030204" pitchFamily="49" charset="0"/>
-              </a:rPr>
-              <a:t>nterpretación de coeficientes</a:t>
+          <a:bodyPr wrap="square" rtlCol="0">
+            <a:spAutoFit/>
+          </a:bodyPr>
+          <a:lstStyle/>
+          <a:p>
+            <a:r>
+              <a:rPr lang="es-MX" sz="1600" dirty="0"/>
+              <a:t>Mean:</a:t>
+            </a:r>
+          </a:p>
+          <a:p>
+            <a:r>
+              <a:rPr lang="es-MX" sz="1600" dirty="0"/>
+              <a:t>Median:</a:t>
+            </a:r>
+          </a:p>
+          <a:p>
+            <a:r>
+              <a:rPr lang="es-MX" sz="1600" dirty="0"/>
+              <a:t>Q3:</a:t>
+            </a:r>
+          </a:p>
+        </p:txBody>
+      </p:sp>
+      <p:sp>
+        <p:nvSpPr>
+          <p:cNvPr id="9" name="CuadroTexto 8">
+            <a:extLst>
+              <a:ext uri="{FF2B5EF4-FFF2-40B4-BE49-F238E27FC236}">
+                <a16:creationId xmlns:a16="http://schemas.microsoft.com/office/drawing/2014/main" id="{5C28A5B6-1863-0F9A-EB36-04D9C766E082}"/>
+              </a:ext>
+            </a:extLst>
+          </p:cNvPr>
+          <p:cNvSpPr txBox="1"/>
+          <p:nvPr/>
+        </p:nvSpPr>
+        <p:spPr>
+          <a:xfrm>
+            <a:off x="783771" y="286899"/>
+            <a:ext cx="5312229" cy="400110"/>
+          </a:xfrm>
+          <a:prstGeom prst="rect">
+            <a:avLst/>
+          </a:prstGeom>
+          <a:noFill/>
+        </p:spPr>
+        <p:txBody>
+          <a:bodyPr wrap="square" rtlCol="0">
+            <a:spAutoFit/>
+          </a:bodyPr>
+          <a:lstStyle/>
+          <a:p>
+            <a:r>
+              <a:rPr lang="es-MX" sz="2000" dirty="0"/>
+              <a:t>Variables numéricas</a:t>
             </a:r>
           </a:p>
         </p:txBody>
@@ -5703,7 +6417,7 @@
     </p:spTree>
     <p:extLst>
       <p:ext uri="{BB962C8B-B14F-4D97-AF65-F5344CB8AC3E}">
-        <p14:creationId xmlns:p14="http://schemas.microsoft.com/office/powerpoint/2010/main" val="4024783150"/>
+        <p14:creationId xmlns:p14="http://schemas.microsoft.com/office/powerpoint/2010/main" val="623055757"/>
       </p:ext>
     </p:extLst>
   </p:cSld>
@@ -5730,101 +6444,265 @@
           <a:chExt cx="0" cy="0"/>
         </a:xfrm>
       </p:grpSpPr>
-      <p:sp>
-        <p:nvSpPr>
-          <p:cNvPr id="2" name="Título 1">
-            <a:extLst>
-              <a:ext uri="{FF2B5EF4-FFF2-40B4-BE49-F238E27FC236}">
-                <a16:creationId xmlns:a16="http://schemas.microsoft.com/office/drawing/2014/main" id="{18A09D85-EB93-3091-BEC8-0C192C23096B}"/>
-              </a:ext>
-            </a:extLst>
-          </p:cNvPr>
-          <p:cNvSpPr>
-            <a:spLocks noGrp="1"/>
-          </p:cNvSpPr>
-          <p:nvPr>
-            <p:ph type="title"/>
-          </p:nvPr>
+      <p:graphicFrame>
+        <p:nvGraphicFramePr>
+          <p:cNvPr id="4" name="Objeto 3">
+            <a:extLst>
+              <a:ext uri="{FF2B5EF4-FFF2-40B4-BE49-F238E27FC236}">
+                <a16:creationId xmlns:a16="http://schemas.microsoft.com/office/drawing/2014/main" id="{03E5E775-AC53-DC5D-5706-474CB7695FB2}"/>
+              </a:ext>
+            </a:extLst>
+          </p:cNvPr>
+          <p:cNvGraphicFramePr>
+            <a:graphicFrameLocks noChangeAspect="1"/>
+          </p:cNvGraphicFramePr>
+          <p:nvPr>
+            <p:extLst>
+              <p:ext uri="{D42A27DB-BD31-4B8C-83A1-F6EECF244321}">
+                <p14:modId xmlns:p14="http://schemas.microsoft.com/office/powerpoint/2010/main" val="2394217253"/>
+              </p:ext>
+            </p:extLst>
+          </p:nvPr>
+        </p:nvGraphicFramePr>
+        <p:xfrm>
+          <a:off x="682300" y="985837"/>
+          <a:ext cx="4561504" cy="2968644"/>
+        </p:xfrm>
+        <a:graphic>
+          <a:graphicData uri="http://schemas.openxmlformats.org/presentationml/2006/ole">
+            <mc:AlternateContent xmlns:mc="http://schemas.openxmlformats.org/markup-compatibility/2006">
+              <mc:Choice xmlns:v="urn:schemas-microsoft-com:vml" Requires="v">
+                <p:oleObj name="PBrush" r:id="rId2" imgW="7505640" imgH="4884480" progId="">
+                  <p:embed/>
+                </p:oleObj>
+              </mc:Choice>
+              <mc:Fallback>
+                <p:oleObj name="PBrush" r:id="rId2" imgW="7505640" imgH="4884480" progId="">
+                  <p:embed/>
+                  <p:pic>
+                    <p:nvPicPr>
+                      <p:cNvPr id="0" name=""/>
+                      <p:cNvPicPr/>
+                      <p:nvPr/>
+                    </p:nvPicPr>
+                    <p:blipFill>
+                      <a:blip r:embed="rId3"/>
+                      <a:stretch>
+                        <a:fillRect/>
+                      </a:stretch>
+                    </p:blipFill>
+                    <p:spPr>
+                      <a:xfrm>
+                        <a:off x="682300" y="985837"/>
+                        <a:ext cx="4561504" cy="2968644"/>
+                      </a:xfrm>
+                      <a:prstGeom prst="rect">
+                        <a:avLst/>
+                      </a:prstGeom>
+                    </p:spPr>
+                  </p:pic>
+                </p:oleObj>
+              </mc:Fallback>
+            </mc:AlternateContent>
+          </a:graphicData>
+        </a:graphic>
+      </p:graphicFrame>
+      <p:graphicFrame>
+        <p:nvGraphicFramePr>
+          <p:cNvPr id="5" name="Objeto 4">
+            <a:extLst>
+              <a:ext uri="{FF2B5EF4-FFF2-40B4-BE49-F238E27FC236}">
+                <a16:creationId xmlns:a16="http://schemas.microsoft.com/office/drawing/2014/main" id="{E5ECDBE7-BB4F-74F5-61B7-10CC68B3F6AF}"/>
+              </a:ext>
+            </a:extLst>
+          </p:cNvPr>
+          <p:cNvGraphicFramePr>
+            <a:graphicFrameLocks noChangeAspect="1"/>
+          </p:cNvGraphicFramePr>
+          <p:nvPr>
+            <p:extLst>
+              <p:ext uri="{D42A27DB-BD31-4B8C-83A1-F6EECF244321}">
+                <p14:modId xmlns:p14="http://schemas.microsoft.com/office/powerpoint/2010/main" val="954391201"/>
+              </p:ext>
+            </p:extLst>
+          </p:nvPr>
+        </p:nvGraphicFramePr>
+        <p:xfrm>
+          <a:off x="7095042" y="1069813"/>
+          <a:ext cx="4414658" cy="2884668"/>
+        </p:xfrm>
+        <a:graphic>
+          <a:graphicData uri="http://schemas.openxmlformats.org/presentationml/2006/ole">
+            <mc:AlternateContent xmlns:mc="http://schemas.openxmlformats.org/markup-compatibility/2006">
+              <mc:Choice xmlns:v="urn:schemas-microsoft-com:vml" Requires="v">
+                <p:oleObj name="PBrush" r:id="rId4" imgW="7475400" imgH="4884480" progId="">
+                  <p:embed/>
+                </p:oleObj>
+              </mc:Choice>
+              <mc:Fallback>
+                <p:oleObj name="PBrush" r:id="rId4" imgW="7475400" imgH="4884480" progId="">
+                  <p:embed/>
+                  <p:pic>
+                    <p:nvPicPr>
+                      <p:cNvPr id="0" name=""/>
+                      <p:cNvPicPr/>
+                      <p:nvPr/>
+                    </p:nvPicPr>
+                    <p:blipFill>
+                      <a:blip r:embed="rId5"/>
+                      <a:stretch>
+                        <a:fillRect/>
+                      </a:stretch>
+                    </p:blipFill>
+                    <p:spPr>
+                      <a:xfrm>
+                        <a:off x="7095042" y="1069813"/>
+                        <a:ext cx="4414658" cy="2884668"/>
+                      </a:xfrm>
+                      <a:prstGeom prst="rect">
+                        <a:avLst/>
+                      </a:prstGeom>
+                    </p:spPr>
+                  </p:pic>
+                </p:oleObj>
+              </mc:Fallback>
+            </mc:AlternateContent>
+          </a:graphicData>
+        </a:graphic>
+      </p:graphicFrame>
+      <p:sp>
+        <p:nvSpPr>
+          <p:cNvPr id="6" name="CuadroTexto 5">
+            <a:extLst>
+              <a:ext uri="{FF2B5EF4-FFF2-40B4-BE49-F238E27FC236}">
+                <a16:creationId xmlns:a16="http://schemas.microsoft.com/office/drawing/2014/main" id="{90C4CA8E-E03F-EE39-395D-480CDA56D770}"/>
+              </a:ext>
+            </a:extLst>
+          </p:cNvPr>
+          <p:cNvSpPr txBox="1"/>
+          <p:nvPr/>
         </p:nvSpPr>
         <p:spPr>
           <a:xfrm>
-            <a:off x="700635" y="922096"/>
-            <a:ext cx="10691265" cy="713757"/>
+            <a:off x="682300" y="4422710"/>
+            <a:ext cx="4180114" cy="861774"/>
           </a:xfrm>
+          <a:prstGeom prst="rect">
+            <a:avLst/>
+          </a:prstGeom>
+          <a:noFill/>
         </p:spPr>
         <p:txBody>
-          <a:bodyPr/>
-          <a:lstStyle/>
-          <a:p>
-            <a:r>
-              <a:rPr lang="es-MX" b="1" dirty="0"/>
-              <a:t>Desempeño </a:t>
-            </a:r>
-          </a:p>
-        </p:txBody>
-      </p:sp>
-      <p:sp>
-        <p:nvSpPr>
-          <p:cNvPr id="3" name="Marcador de contenido 2">
-            <a:extLst>
-              <a:ext uri="{FF2B5EF4-FFF2-40B4-BE49-F238E27FC236}">
-                <a16:creationId xmlns:a16="http://schemas.microsoft.com/office/drawing/2014/main" id="{10B308AB-EB65-808F-E1A9-C4A976D357DE}"/>
-              </a:ext>
-            </a:extLst>
-          </p:cNvPr>
-          <p:cNvSpPr>
-            <a:spLocks noGrp="1"/>
-          </p:cNvSpPr>
-          <p:nvPr>
-            <p:ph idx="1"/>
-          </p:nvPr>
+          <a:bodyPr wrap="square" rtlCol="0">
+            <a:spAutoFit/>
+          </a:bodyPr>
+          <a:lstStyle/>
+          <a:p>
+            <a:r>
+              <a:rPr lang="es-MX" sz="1600" dirty="0"/>
+              <a:t>Mean:</a:t>
+            </a:r>
+          </a:p>
+          <a:p>
+            <a:r>
+              <a:rPr lang="es-MX" sz="1600" dirty="0"/>
+              <a:t>Median:</a:t>
+            </a:r>
+          </a:p>
+          <a:p>
+            <a:r>
+              <a:rPr lang="es-MX" sz="1600" dirty="0"/>
+              <a:t>Q3:</a:t>
+            </a:r>
+          </a:p>
+        </p:txBody>
+      </p:sp>
+      <p:sp>
+        <p:nvSpPr>
+          <p:cNvPr id="7" name="CuadroTexto 6">
+            <a:extLst>
+              <a:ext uri="{FF2B5EF4-FFF2-40B4-BE49-F238E27FC236}">
+                <a16:creationId xmlns:a16="http://schemas.microsoft.com/office/drawing/2014/main" id="{9883CA6A-1DC5-A65B-3BC3-135E63ACEE51}"/>
+              </a:ext>
+            </a:extLst>
+          </p:cNvPr>
+          <p:cNvSpPr txBox="1"/>
+          <p:nvPr/>
         </p:nvSpPr>
         <p:spPr>
           <a:xfrm>
-            <a:off x="700635" y="1635853"/>
-            <a:ext cx="10691265" cy="4293361"/>
+            <a:off x="7095042" y="4422710"/>
+            <a:ext cx="4180114" cy="861774"/>
           </a:xfrm>
+          <a:prstGeom prst="rect">
+            <a:avLst/>
+          </a:prstGeom>
+          <a:noFill/>
         </p:spPr>
         <p:txBody>
-          <a:bodyPr/>
-          <a:lstStyle/>
-          <a:p>
-            <a:pPr marL="285750" indent="-285750" algn="just"/>
-            <a:r>
-              <a:rPr lang="es-MX" b="0" i="0" dirty="0">
-                <a:effectLst/>
-                <a:latin typeface="Consolas" panose="020B0609020204030204" pitchFamily="49" charset="0"/>
-              </a:rPr>
-              <a:t>Desempeño con cada uno de los 3 umbrales (</a:t>
-            </a:r>
-            <a:r>
-              <a:rPr lang="es-MX" b="0" i="0" dirty="0" err="1">
-                <a:effectLst/>
-                <a:latin typeface="Consolas" panose="020B0609020204030204" pitchFamily="49" charset="0"/>
-              </a:rPr>
-              <a:t>thresholds</a:t>
-            </a:r>
-            <a:r>
-              <a:rPr lang="es-MX" b="0" i="0" dirty="0">
-                <a:effectLst/>
-                <a:latin typeface="Consolas" panose="020B0609020204030204" pitchFamily="49" charset="0"/>
-              </a:rPr>
-              <a:t>) utilizados e identificar el seleccionado</a:t>
-            </a:r>
-          </a:p>
-          <a:p>
-            <a:pPr marL="285750" indent="-285750"/>
-            <a:endParaRPr lang="en-US" b="0" i="0" dirty="0">
-              <a:effectLst/>
-              <a:latin typeface="Consolas" panose="020B0609020204030204" pitchFamily="49" charset="0"/>
-            </a:endParaRPr>
+          <a:bodyPr wrap="square" rtlCol="0">
+            <a:spAutoFit/>
+          </a:bodyPr>
+          <a:lstStyle/>
+          <a:p>
+            <a:r>
+              <a:rPr lang="es-MX" sz="1600" dirty="0"/>
+              <a:t>Mean:</a:t>
+            </a:r>
+          </a:p>
+          <a:p>
+            <a:r>
+              <a:rPr lang="es-MX" sz="1600" dirty="0"/>
+              <a:t>Median:</a:t>
+            </a:r>
+          </a:p>
+          <a:p>
+            <a:r>
+              <a:rPr lang="es-MX" sz="1600" dirty="0"/>
+              <a:t>Q3:</a:t>
+            </a:r>
+          </a:p>
+        </p:txBody>
+      </p:sp>
+      <p:sp>
+        <p:nvSpPr>
+          <p:cNvPr id="8" name="CuadroTexto 7">
+            <a:extLst>
+              <a:ext uri="{FF2B5EF4-FFF2-40B4-BE49-F238E27FC236}">
+                <a16:creationId xmlns:a16="http://schemas.microsoft.com/office/drawing/2014/main" id="{4EDC69B0-0FEA-2743-5C7D-1EA1820FF646}"/>
+              </a:ext>
+            </a:extLst>
+          </p:cNvPr>
+          <p:cNvSpPr txBox="1"/>
+          <p:nvPr/>
+        </p:nvSpPr>
+        <p:spPr>
+          <a:xfrm>
+            <a:off x="783771" y="286899"/>
+            <a:ext cx="5312229" cy="400110"/>
+          </a:xfrm>
+          <a:prstGeom prst="rect">
+            <a:avLst/>
+          </a:prstGeom>
+          <a:noFill/>
+        </p:spPr>
+        <p:txBody>
+          <a:bodyPr wrap="square" rtlCol="0">
+            <a:spAutoFit/>
+          </a:bodyPr>
+          <a:lstStyle/>
+          <a:p>
+            <a:r>
+              <a:rPr lang="es-MX" sz="2000" dirty="0"/>
+              <a:t>Variables numéricas</a:t>
+            </a:r>
           </a:p>
         </p:txBody>
       </p:sp>
     </p:spTree>
     <p:extLst>
       <p:ext uri="{BB962C8B-B14F-4D97-AF65-F5344CB8AC3E}">
-        <p14:creationId xmlns:p14="http://schemas.microsoft.com/office/powerpoint/2010/main" val="2967230457"/>
+        <p14:creationId xmlns:p14="http://schemas.microsoft.com/office/powerpoint/2010/main" val="4191919960"/>
       </p:ext>
     </p:extLst>
   </p:cSld>
@@ -5837,14 +6715,6 @@
 <file path=ppt/slides/slide8.xml><?xml version="1.0" encoding="utf-8"?>
 <p:sld xmlns:a="http://schemas.openxmlformats.org/drawingml/2006/main" xmlns:r="http://schemas.openxmlformats.org/officeDocument/2006/relationships" xmlns:p="http://schemas.openxmlformats.org/presentationml/2006/main">
   <p:cSld>
-    <p:bg>
-      <p:bgPr>
-        <a:solidFill>
-          <a:schemeClr val="bg1"/>
-        </a:solidFill>
-        <a:effectLst/>
-      </p:bgPr>
-    </p:bg>
     <p:spTree>
       <p:nvGrpSpPr>
         <p:cNvPr id="1" name=""/>
@@ -5859,306 +6729,96 @@
           <a:chExt cx="0" cy="0"/>
         </a:xfrm>
       </p:grpSpPr>
-      <p:sp useBgFill="1">
-        <p:nvSpPr>
-          <p:cNvPr id="3081" name="Rectangle 3080">
-            <a:extLst>
-              <a:ext uri="{FF2B5EF4-FFF2-40B4-BE49-F238E27FC236}">
-                <a16:creationId xmlns:a16="http://schemas.microsoft.com/office/drawing/2014/main" id="{341BFA31-6544-45C2-9DA0-9E1C5E0B1959}"/>
-              </a:ext>
-              <a:ext uri="{C183D7F6-B498-43B3-948B-1728B52AA6E4}">
-                <adec:decorative xmlns:adec="http://schemas.microsoft.com/office/drawing/2017/decorative" val="1"/>
-              </a:ext>
-            </a:extLst>
-          </p:cNvPr>
-          <p:cNvSpPr>
-            <a:spLocks noGrp="1" noRot="1" noChangeAspect="1" noMove="1" noResize="1" noEditPoints="1" noAdjustHandles="1" noChangeArrowheads="1" noChangeShapeType="1" noTextEdit="1"/>
-          </p:cNvSpPr>
-          <p:nvPr>
-            <p:extLst>
-              <p:ext uri="{386F3935-93C4-4BCD-93E2-E3B085C9AB24}">
-                <p16:designElem xmlns:p16="http://schemas.microsoft.com/office/powerpoint/2015/main" val="1"/>
-              </p:ext>
-            </p:extLst>
+      <p:sp>
+        <p:nvSpPr>
+          <p:cNvPr id="2" name="Título 1">
+            <a:extLst>
+              <a:ext uri="{FF2B5EF4-FFF2-40B4-BE49-F238E27FC236}">
+                <a16:creationId xmlns:a16="http://schemas.microsoft.com/office/drawing/2014/main" id="{18A09D85-EB93-3091-BEC8-0C192C23096B}"/>
+              </a:ext>
+            </a:extLst>
+          </p:cNvPr>
+          <p:cNvSpPr>
+            <a:spLocks noGrp="1"/>
+          </p:cNvSpPr>
+          <p:nvPr>
+            <p:ph type="title"/>
           </p:nvPr>
         </p:nvSpPr>
         <p:spPr>
           <a:xfrm>
-            <a:off x="0" y="0"/>
-            <a:ext cx="12192000" cy="6858000"/>
+            <a:off x="700635" y="922096"/>
+            <a:ext cx="10691265" cy="713757"/>
           </a:xfrm>
-          <a:prstGeom prst="rect">
-            <a:avLst/>
-          </a:prstGeom>
-          <a:ln w="12700" cap="flat" cmpd="sng" algn="ctr">
-            <a:noFill/>
-            <a:prstDash val="solid"/>
-            <a:miter lim="800000"/>
-          </a:ln>
-          <a:effectLst/>
-          <a:extLst>
-            <a:ext uri="{91240B29-F687-4F45-9708-019B960494DF}">
-              <a14:hiddenLine xmlns:a14="http://schemas.microsoft.com/office/drawing/2010/main" w="12700" cap="flat" cmpd="sng" algn="ctr">
-                <a:solidFill>
-                  <a:schemeClr val="accent1">
-                    <a:shade val="50000"/>
-                  </a:schemeClr>
-                </a:solidFill>
-                <a:prstDash val="solid"/>
-                <a:miter lim="800000"/>
-              </a14:hiddenLine>
-            </a:ext>
-          </a:extLst>
         </p:spPr>
-        <p:style>
-          <a:lnRef idx="2">
-            <a:schemeClr val="accent1">
-              <a:shade val="50000"/>
-            </a:schemeClr>
-          </a:lnRef>
-          <a:fillRef idx="1">
-            <a:schemeClr val="accent1"/>
-          </a:fillRef>
-          <a:effectRef idx="0">
-            <a:schemeClr val="accent1"/>
-          </a:effectRef>
-          <a:fontRef idx="minor">
-            <a:schemeClr val="lt1"/>
-          </a:fontRef>
-        </p:style>
-        <p:txBody>
-          <a:bodyPr rtlCol="0" anchor="ctr"/>
-          <a:lstStyle/>
-          <a:p>
-            <a:pPr algn="ctr"/>
-            <a:endParaRPr lang="en-US"/>
-          </a:p>
-        </p:txBody>
-      </p:sp>
-      <p:sp>
-        <p:nvSpPr>
-          <p:cNvPr id="2" name="Título 1">
-            <a:extLst>
-              <a:ext uri="{FF2B5EF4-FFF2-40B4-BE49-F238E27FC236}">
-                <a16:creationId xmlns:a16="http://schemas.microsoft.com/office/drawing/2014/main" id="{D20D4173-25B5-7DF6-8617-1C50325D58C7}"/>
-              </a:ext>
-            </a:extLst>
-          </p:cNvPr>
-          <p:cNvSpPr>
-            <a:spLocks noGrp="1"/>
-          </p:cNvSpPr>
-          <p:nvPr>
-            <p:ph type="ctrTitle"/>
+        <p:txBody>
+          <a:bodyPr/>
+          <a:lstStyle/>
+          <a:p>
+            <a:r>
+              <a:rPr lang="es-MX" b="1" dirty="0"/>
+              <a:t>Modelo</a:t>
+            </a:r>
+          </a:p>
+        </p:txBody>
+      </p:sp>
+      <p:sp>
+        <p:nvSpPr>
+          <p:cNvPr id="3" name="Marcador de contenido 2">
+            <a:extLst>
+              <a:ext uri="{FF2B5EF4-FFF2-40B4-BE49-F238E27FC236}">
+                <a16:creationId xmlns:a16="http://schemas.microsoft.com/office/drawing/2014/main" id="{10B308AB-EB65-808F-E1A9-C4A976D357DE}"/>
+              </a:ext>
+            </a:extLst>
+          </p:cNvPr>
+          <p:cNvSpPr>
+            <a:spLocks noGrp="1"/>
+          </p:cNvSpPr>
+          <p:nvPr>
+            <p:ph idx="1"/>
           </p:nvPr>
         </p:nvSpPr>
         <p:spPr>
           <a:xfrm>
-            <a:off x="695326" y="4742029"/>
-            <a:ext cx="10765912" cy="925950"/>
+            <a:off x="700635" y="1635853"/>
+            <a:ext cx="10691265" cy="4293361"/>
           </a:xfrm>
         </p:spPr>
         <p:txBody>
-          <a:bodyPr>
-            <a:normAutofit/>
-          </a:bodyPr>
-          <a:lstStyle/>
-          <a:p>
-            <a:r>
-              <a:rPr lang="es-MX" b="1" dirty="0"/>
-              <a:t>Fase 2</a:t>
-            </a:r>
-          </a:p>
-        </p:txBody>
-      </p:sp>
-      <p:sp>
-        <p:nvSpPr>
-          <p:cNvPr id="3" name="Subtítulo 2">
-            <a:extLst>
-              <a:ext uri="{FF2B5EF4-FFF2-40B4-BE49-F238E27FC236}">
-                <a16:creationId xmlns:a16="http://schemas.microsoft.com/office/drawing/2014/main" id="{1F4E2AE9-C111-DE7D-6177-3DC76E8529F5}"/>
-              </a:ext>
-            </a:extLst>
-          </p:cNvPr>
-          <p:cNvSpPr>
-            <a:spLocks noGrp="1"/>
-          </p:cNvSpPr>
-          <p:nvPr>
-            <p:ph type="subTitle" idx="1"/>
-          </p:nvPr>
-        </p:nvSpPr>
-        <p:spPr>
-          <a:xfrm>
-            <a:off x="695325" y="5731877"/>
-            <a:ext cx="8829674" cy="429622"/>
-          </a:xfrm>
-        </p:spPr>
-        <p:txBody>
-          <a:bodyPr anchor="t">
-            <a:normAutofit/>
-          </a:bodyPr>
-          <a:lstStyle/>
-          <a:p>
-            <a:pPr>
-              <a:lnSpc>
-                <a:spcPct val="110000"/>
-              </a:lnSpc>
-            </a:pPr>
-            <a:r>
-              <a:rPr lang="es-MX">
+          <a:bodyPr/>
+          <a:lstStyle/>
+          <a:p>
+            <a:pPr marL="285750" indent="-285750"/>
+            <a:r>
+              <a:rPr lang="es-MX" b="0" i="0" dirty="0">
+                <a:effectLst/>
                 <a:latin typeface="Consolas" panose="020B0609020204030204" pitchFamily="49" charset="0"/>
               </a:rPr>
-              <a:t>Análisis de Supervivencia</a:t>
-            </a:r>
-          </a:p>
-        </p:txBody>
-      </p:sp>
-      <p:pic>
-        <p:nvPicPr>
-          <p:cNvPr id="3076" name="Picture 4" descr="Shopping cart design: patterns for conversion - Justinmind">
-            <a:extLst>
-              <a:ext uri="{FF2B5EF4-FFF2-40B4-BE49-F238E27FC236}">
-                <a16:creationId xmlns:a16="http://schemas.microsoft.com/office/drawing/2014/main" id="{C35C2109-D751-23CF-9702-2CF238239873}"/>
-              </a:ext>
-            </a:extLst>
-          </p:cNvPr>
-          <p:cNvPicPr>
-            <a:picLocks noChangeAspect="1" noChangeArrowheads="1"/>
-          </p:cNvPicPr>
-          <p:nvPr/>
-        </p:nvPicPr>
-        <p:blipFill>
-          <a:blip r:embed="rId2">
-            <a:extLst>
-              <a:ext uri="{28A0092B-C50C-407E-A947-70E740481C1C}">
-                <a14:useLocalDpi xmlns:a14="http://schemas.microsoft.com/office/drawing/2010/main" val="0"/>
-              </a:ext>
-            </a:extLst>
-          </a:blip>
-          <a:stretch>
-            <a:fillRect/>
-          </a:stretch>
-        </p:blipFill>
-        <p:spPr bwMode="auto">
-          <a:xfrm>
-            <a:off x="800100" y="1021983"/>
-            <a:ext cx="5134573" cy="3286126"/>
-          </a:xfrm>
-          <a:prstGeom prst="rect">
-            <a:avLst/>
-          </a:prstGeom>
-          <a:noFill/>
-          <a:extLst>
-            <a:ext uri="{909E8E84-426E-40DD-AFC4-6F175D3DCCD1}">
-              <a14:hiddenFill xmlns:a14="http://schemas.microsoft.com/office/drawing/2010/main">
-                <a:solidFill>
-                  <a:srgbClr val="FFFFFF"/>
-                </a:solidFill>
-              </a14:hiddenFill>
-            </a:ext>
-          </a:extLst>
-        </p:spPr>
-      </p:pic>
-      <p:pic>
-        <p:nvPicPr>
-          <p:cNvPr id="3074" name="Picture 2" descr="Empty Cart Projects | Photos, videos, logos, illustrations and branding on  Behance">
-            <a:extLst>
-              <a:ext uri="{FF2B5EF4-FFF2-40B4-BE49-F238E27FC236}">
-                <a16:creationId xmlns:a16="http://schemas.microsoft.com/office/drawing/2014/main" id="{882DF97A-0075-6E20-2C64-C9DE237FCAD6}"/>
-              </a:ext>
-            </a:extLst>
-          </p:cNvPr>
-          <p:cNvPicPr>
-            <a:picLocks noChangeAspect="1" noChangeArrowheads="1"/>
-          </p:cNvPicPr>
-          <p:nvPr/>
-        </p:nvPicPr>
-        <p:blipFill rotWithShape="1">
-          <a:blip r:embed="rId3">
-            <a:extLst>
-              <a:ext uri="{28A0092B-C50C-407E-A947-70E740481C1C}">
-                <a14:useLocalDpi xmlns:a14="http://schemas.microsoft.com/office/drawing/2010/main" val="0"/>
-              </a:ext>
-            </a:extLst>
-          </a:blip>
-          <a:srcRect b="8317"/>
-          <a:stretch/>
-        </p:blipFill>
-        <p:spPr bwMode="auto">
-          <a:xfrm>
-            <a:off x="6809555" y="1021983"/>
-            <a:ext cx="4582345" cy="3286123"/>
-          </a:xfrm>
-          <a:prstGeom prst="rect">
-            <a:avLst/>
-          </a:prstGeom>
-          <a:noFill/>
-          <a:extLst>
-            <a:ext uri="{909E8E84-426E-40DD-AFC4-6F175D3DCCD1}">
-              <a14:hiddenFill xmlns:a14="http://schemas.microsoft.com/office/drawing/2010/main">
-                <a:solidFill>
-                  <a:srgbClr val="FFFFFF"/>
-                </a:solidFill>
-              </a14:hiddenFill>
-            </a:ext>
-          </a:extLst>
-        </p:spPr>
-      </p:pic>
-      <p:cxnSp>
-        <p:nvCxnSpPr>
-          <p:cNvPr id="3083" name="Straight Connector 3082">
-            <a:extLst>
-              <a:ext uri="{FF2B5EF4-FFF2-40B4-BE49-F238E27FC236}">
-                <a16:creationId xmlns:a16="http://schemas.microsoft.com/office/drawing/2014/main" id="{DC36F877-5419-44C1-A2CD-376BDDDC3E41}"/>
-              </a:ext>
-              <a:ext uri="{C183D7F6-B498-43B3-948B-1728B52AA6E4}">
-                <adec:decorative xmlns:adec="http://schemas.microsoft.com/office/drawing/2017/decorative" val="1"/>
-              </a:ext>
-            </a:extLst>
-          </p:cNvPr>
-          <p:cNvCxnSpPr>
-            <a:cxnSpLocks noGrp="1" noRot="1" noChangeAspect="1" noMove="1" noResize="1" noEditPoints="1" noAdjustHandles="1" noChangeArrowheads="1" noChangeShapeType="1"/>
-          </p:cNvCxnSpPr>
-          <p:nvPr>
-            <p:extLst>
-              <p:ext uri="{386F3935-93C4-4BCD-93E2-E3B085C9AB24}">
-                <p16:designElem xmlns:p16="http://schemas.microsoft.com/office/powerpoint/2015/main" val="1"/>
-              </p:ext>
-            </p:extLst>
-          </p:nvPr>
-        </p:nvCxnSpPr>
-        <p:spPr>
-          <a:xfrm>
-            <a:off x="800100" y="4667603"/>
-            <a:ext cx="10591800" cy="0"/>
-          </a:xfrm>
-          <a:prstGeom prst="line">
-            <a:avLst/>
-          </a:prstGeom>
-          <a:ln w="44450">
-            <a:solidFill>
-              <a:schemeClr val="tx1"/>
-            </a:solidFill>
-          </a:ln>
-        </p:spPr>
-        <p:style>
-          <a:lnRef idx="1">
-            <a:schemeClr val="accent1"/>
-          </a:lnRef>
-          <a:fillRef idx="0">
-            <a:schemeClr val="accent1"/>
-          </a:fillRef>
-          <a:effectRef idx="0">
-            <a:schemeClr val="accent1"/>
-          </a:effectRef>
-          <a:fontRef idx="minor">
-            <a:schemeClr val="tx1"/>
-          </a:fontRef>
-        </p:style>
-      </p:cxnSp>
+              <a:t>Variables utilizadas</a:t>
+            </a:r>
+          </a:p>
+          <a:p>
+            <a:pPr marL="285750" indent="-285750"/>
+            <a:r>
+              <a:rPr lang="es-MX" dirty="0">
+                <a:latin typeface="Consolas" panose="020B0609020204030204" pitchFamily="49" charset="0"/>
+              </a:rPr>
+              <a:t>I</a:t>
+            </a:r>
+            <a:r>
+              <a:rPr lang="es-MX" b="0" i="0" dirty="0">
+                <a:effectLst/>
+                <a:latin typeface="Consolas" panose="020B0609020204030204" pitchFamily="49" charset="0"/>
+              </a:rPr>
+              <a:t>nterpretación de coeficientes</a:t>
+            </a:r>
+          </a:p>
+        </p:txBody>
+      </p:sp>
     </p:spTree>
     <p:extLst>
       <p:ext uri="{BB962C8B-B14F-4D97-AF65-F5344CB8AC3E}">
-        <p14:creationId xmlns:p14="http://schemas.microsoft.com/office/powerpoint/2010/main" val="1526287764"/>
+        <p14:creationId xmlns:p14="http://schemas.microsoft.com/office/powerpoint/2010/main" val="4024783150"/>
       </p:ext>
     </p:extLst>
   </p:cSld>
@@ -6213,7 +6873,7 @@
           <a:p>
             <a:r>
               <a:rPr lang="es-MX" b="1" dirty="0"/>
-              <a:t>Definición del Problema</a:t>
+              <a:t>Desempeño </a:t>
             </a:r>
           </a:p>
         </p:txBody>
@@ -6245,7 +6905,31 @@
           <a:lstStyle/>
           <a:p>
             <a:pPr marL="285750" indent="-285750" algn="just"/>
-            <a:endParaRPr lang="es-MX" b="0" i="0" dirty="0">
+            <a:r>
+              <a:rPr lang="es-MX" b="0" i="0" dirty="0">
+                <a:effectLst/>
+                <a:latin typeface="Consolas" panose="020B0609020204030204" pitchFamily="49" charset="0"/>
+              </a:rPr>
+              <a:t>Desempeño con cada uno de los 3 umbrales (</a:t>
+            </a:r>
+            <a:r>
+              <a:rPr lang="es-MX" b="0" i="0" dirty="0" err="1">
+                <a:effectLst/>
+                <a:latin typeface="Consolas" panose="020B0609020204030204" pitchFamily="49" charset="0"/>
+              </a:rPr>
+              <a:t>thresholds</a:t>
+            </a:r>
+            <a:r>
+              <a:rPr lang="es-MX" b="0" i="0" dirty="0">
+                <a:effectLst/>
+                <a:latin typeface="Consolas" panose="020B0609020204030204" pitchFamily="49" charset="0"/>
+              </a:rPr>
+              <a:t>) utilizados e identificar el seleccionado</a:t>
+            </a:r>
+          </a:p>
+          <a:p>
+            <a:pPr marL="285750" indent="-285750"/>
+            <a:endParaRPr lang="en-US" b="0" i="0" dirty="0">
               <a:effectLst/>
               <a:latin typeface="Consolas" panose="020B0609020204030204" pitchFamily="49" charset="0"/>
             </a:endParaRPr>
@@ -6255,7 +6939,7 @@
     </p:spTree>
     <p:extLst>
       <p:ext uri="{BB962C8B-B14F-4D97-AF65-F5344CB8AC3E}">
-        <p14:creationId xmlns:p14="http://schemas.microsoft.com/office/powerpoint/2010/main" val="1596593790"/>
+        <p14:creationId xmlns:p14="http://schemas.microsoft.com/office/powerpoint/2010/main" val="2967230457"/>
       </p:ext>
     </p:extLst>
   </p:cSld>

</xml_diff>